<commit_message>
editFile: Editing comments in code for analytics
</commit_message>
<xml_diff>
--- a/Part 2 Intro to Algorithms/Algo workshop.pptx
+++ b/Part 2 Intro to Algorithms/Algo workshop.pptx
@@ -25795,7 +25795,7 @@
             <a:tbl>
               <a:tblPr>
                 <a:noFill/>
-                <a:tableStyleId>{3DD34422-EF09-4D33-91B6-2E88F71D6240}</a:tableStyleId>
+                <a:tableStyleId>{F6713E10-25FC-4FAA-B511-B4F4DF895E4D}</a:tableStyleId>
               </a:tblPr>
               <a:tblGrid>
                 <a:gridCol w="1034150"/>
@@ -25988,7 +25988,7 @@
             <a:tbl>
               <a:tblPr>
                 <a:noFill/>
-                <a:tableStyleId>{3DD34422-EF09-4D33-91B6-2E88F71D6240}</a:tableStyleId>
+                <a:tableStyleId>{F6713E10-25FC-4FAA-B511-B4F4DF895E4D}</a:tableStyleId>
               </a:tblPr>
               <a:tblGrid>
                 <a:gridCol w="1034150"/>
@@ -26346,7 +26346,7 @@
             <a:tbl>
               <a:tblPr>
                 <a:noFill/>
-                <a:tableStyleId>{3DD34422-EF09-4D33-91B6-2E88F71D6240}</a:tableStyleId>
+                <a:tableStyleId>{F6713E10-25FC-4FAA-B511-B4F4DF895E4D}</a:tableStyleId>
               </a:tblPr>
               <a:tblGrid>
                 <a:gridCol w="1034150"/>
@@ -26543,7 +26543,7 @@
             <a:tbl>
               <a:tblPr>
                 <a:noFill/>
-                <a:tableStyleId>{3DD34422-EF09-4D33-91B6-2E88F71D6240}</a:tableStyleId>
+                <a:tableStyleId>{F6713E10-25FC-4FAA-B511-B4F4DF895E4D}</a:tableStyleId>
               </a:tblPr>
               <a:tblGrid>
                 <a:gridCol w="1034150"/>
@@ -26943,7 +26943,7 @@
             <a:tbl>
               <a:tblPr>
                 <a:noFill/>
-                <a:tableStyleId>{3DD34422-EF09-4D33-91B6-2E88F71D6240}</a:tableStyleId>
+                <a:tableStyleId>{F6713E10-25FC-4FAA-B511-B4F4DF895E4D}</a:tableStyleId>
               </a:tblPr>
               <a:tblGrid>
                 <a:gridCol w="1034150"/>
@@ -31323,7 +31323,7 @@
             <a:tbl>
               <a:tblPr>
                 <a:noFill/>
-                <a:tableStyleId>{3DD34422-EF09-4D33-91B6-2E88F71D6240}</a:tableStyleId>
+                <a:tableStyleId>{F6713E10-25FC-4FAA-B511-B4F4DF895E4D}</a:tableStyleId>
               </a:tblPr>
               <a:tblGrid>
                 <a:gridCol w="1034150"/>
@@ -31810,7 +31810,7 @@
             <a:tbl>
               <a:tblPr>
                 <a:noFill/>
-                <a:tableStyleId>{3DD34422-EF09-4D33-91B6-2E88F71D6240}</a:tableStyleId>
+                <a:tableStyleId>{F6713E10-25FC-4FAA-B511-B4F4DF895E4D}</a:tableStyleId>
               </a:tblPr>
               <a:tblGrid>
                 <a:gridCol w="909200"/>
@@ -31927,7 +31927,7 @@
             <a:tbl>
               <a:tblPr>
                 <a:noFill/>
-                <a:tableStyleId>{3DD34422-EF09-4D33-91B6-2E88F71D6240}</a:tableStyleId>
+                <a:tableStyleId>{F6713E10-25FC-4FAA-B511-B4F4DF895E4D}</a:tableStyleId>
               </a:tblPr>
               <a:tblGrid>
                 <a:gridCol w="1034150"/>
@@ -32561,7 +32561,7 @@
             <a:tbl>
               <a:tblPr>
                 <a:noFill/>
-                <a:tableStyleId>{3DD34422-EF09-4D33-91B6-2E88F71D6240}</a:tableStyleId>
+                <a:tableStyleId>{F6713E10-25FC-4FAA-B511-B4F4DF895E4D}</a:tableStyleId>
               </a:tblPr>
               <a:tblGrid>
                 <a:gridCol w="1034150"/>
@@ -32770,7 +32770,7 @@
             <a:tbl>
               <a:tblPr>
                 <a:noFill/>
-                <a:tableStyleId>{3DD34422-EF09-4D33-91B6-2E88F71D6240}</a:tableStyleId>
+                <a:tableStyleId>{F6713E10-25FC-4FAA-B511-B4F4DF895E4D}</a:tableStyleId>
               </a:tblPr>
               <a:tblGrid>
                 <a:gridCol w="1034150"/>
@@ -33569,7 +33569,7 @@
             <a:tbl>
               <a:tblPr>
                 <a:noFill/>
-                <a:tableStyleId>{3DD34422-EF09-4D33-91B6-2E88F71D6240}</a:tableStyleId>
+                <a:tableStyleId>{F6713E10-25FC-4FAA-B511-B4F4DF895E4D}</a:tableStyleId>
               </a:tblPr>
               <a:tblGrid>
                 <a:gridCol w="909200"/>
@@ -33686,7 +33686,7 @@
             <a:tbl>
               <a:tblPr>
                 <a:noFill/>
-                <a:tableStyleId>{3DD34422-EF09-4D33-91B6-2E88F71D6240}</a:tableStyleId>
+                <a:tableStyleId>{F6713E10-25FC-4FAA-B511-B4F4DF895E4D}</a:tableStyleId>
               </a:tblPr>
               <a:tblGrid>
                 <a:gridCol w="1034150"/>
@@ -33895,7 +33895,7 @@
             <a:tbl>
               <a:tblPr>
                 <a:noFill/>
-                <a:tableStyleId>{3DD34422-EF09-4D33-91B6-2E88F71D6240}</a:tableStyleId>
+                <a:tableStyleId>{F6713E10-25FC-4FAA-B511-B4F4DF895E4D}</a:tableStyleId>
               </a:tblPr>
               <a:tblGrid>
                 <a:gridCol w="1034150"/>
@@ -34571,7 +34571,7 @@
             <a:tbl>
               <a:tblPr>
                 <a:noFill/>
-                <a:tableStyleId>{3DD34422-EF09-4D33-91B6-2E88F71D6240}</a:tableStyleId>
+                <a:tableStyleId>{F6713E10-25FC-4FAA-B511-B4F4DF895E4D}</a:tableStyleId>
               </a:tblPr>
               <a:tblGrid>
                 <a:gridCol w="1034150"/>
@@ -34788,7 +34788,7 @@
             <a:tbl>
               <a:tblPr>
                 <a:noFill/>
-                <a:tableStyleId>{3DD34422-EF09-4D33-91B6-2E88F71D6240}</a:tableStyleId>
+                <a:tableStyleId>{F6713E10-25FC-4FAA-B511-B4F4DF895E4D}</a:tableStyleId>
               </a:tblPr>
               <a:tblGrid>
                 <a:gridCol w="1034150"/>
@@ -35567,7 +35567,7 @@
             <a:tbl>
               <a:tblPr>
                 <a:noFill/>
-                <a:tableStyleId>{3DD34422-EF09-4D33-91B6-2E88F71D6240}</a:tableStyleId>
+                <a:tableStyleId>{F6713E10-25FC-4FAA-B511-B4F4DF895E4D}</a:tableStyleId>
               </a:tblPr>
               <a:tblGrid>
                 <a:gridCol w="909200"/>
@@ -35734,7 +35734,7 @@
             <a:tbl>
               <a:tblPr>
                 <a:noFill/>
-                <a:tableStyleId>{3DD34422-EF09-4D33-91B6-2E88F71D6240}</a:tableStyleId>
+                <a:tableStyleId>{F6713E10-25FC-4FAA-B511-B4F4DF895E4D}</a:tableStyleId>
               </a:tblPr>
               <a:tblGrid>
                 <a:gridCol w="1034150"/>
@@ -35951,7 +35951,7 @@
             <a:tbl>
               <a:tblPr>
                 <a:noFill/>
-                <a:tableStyleId>{3DD34422-EF09-4D33-91B6-2E88F71D6240}</a:tableStyleId>
+                <a:tableStyleId>{F6713E10-25FC-4FAA-B511-B4F4DF895E4D}</a:tableStyleId>
               </a:tblPr>
               <a:tblGrid>
                 <a:gridCol w="1034150"/>
@@ -36551,7 +36551,7 @@
             <a:tbl>
               <a:tblPr>
                 <a:noFill/>
-                <a:tableStyleId>{3DD34422-EF09-4D33-91B6-2E88F71D6240}</a:tableStyleId>
+                <a:tableStyleId>{F6713E10-25FC-4FAA-B511-B4F4DF895E4D}</a:tableStyleId>
               </a:tblPr>
               <a:tblGrid>
                 <a:gridCol w="1034150"/>
@@ -36768,7 +36768,7 @@
             <a:tbl>
               <a:tblPr>
                 <a:noFill/>
-                <a:tableStyleId>{3DD34422-EF09-4D33-91B6-2E88F71D6240}</a:tableStyleId>
+                <a:tableStyleId>{F6713E10-25FC-4FAA-B511-B4F4DF895E4D}</a:tableStyleId>
               </a:tblPr>
               <a:tblGrid>
                 <a:gridCol w="1034150"/>

</xml_diff>